<commit_message>
adding a presentation tab
</commit_message>
<xml_diff>
--- a/files/presentation.pptx
+++ b/files/presentation.pptx
@@ -108,6 +108,11 @@
       </a:defRPr>
     </a:lvl9pPr>
   </p:defaultTextStyle>
+  <p:extLst>
+    <p:ext uri="{EFAFB233-063F-42B5-8137-9DF3F51BA10A}">
+      <p15:sldGuideLst xmlns:p15="http://schemas.microsoft.com/office/powerpoint/2012/main"/>
+    </p:ext>
+  </p:extLst>
 </p:presentation>
 </file>
 
@@ -385,7 +390,7 @@
           <a:p>
             <a:fld id="{78ABE3C1-DBE1-495D-B57B-2849774B866A}" type="datetimeFigureOut">
               <a:rPr lang="en-US" dirty="0"/>
-              <a:t>1/22/2020</a:t>
+              <a:t>1/27/2020</a:t>
             </a:fld>
             <a:endParaRPr lang="en-US" dirty="0"/>
           </a:p>
@@ -794,7 +799,7 @@
           <a:p>
             <a:fld id="{446C117F-5CCF-4837-BE5F-2B92066CAFAF}" type="datetimeFigureOut">
               <a:rPr lang="en-US" dirty="0"/>
-              <a:t>1/22/2020</a:t>
+              <a:t>1/27/2020</a:t>
             </a:fld>
             <a:endParaRPr lang="en-US" dirty="0"/>
           </a:p>
@@ -1125,7 +1130,7 @@
           <a:p>
             <a:fld id="{84EB90BD-B6CE-46B7-997F-7313B992CCDC}" type="datetimeFigureOut">
               <a:rPr lang="en-US" dirty="0"/>
-              <a:t>1/22/2020</a:t>
+              <a:t>1/27/2020</a:t>
             </a:fld>
             <a:endParaRPr lang="en-US" dirty="0"/>
           </a:p>
@@ -1525,7 +1530,7 @@
           <a:p>
             <a:fld id="{CDB9D11F-B188-461D-B23F-39381795C052}" type="datetimeFigureOut">
               <a:rPr lang="en-US" dirty="0"/>
-              <a:t>1/22/2020</a:t>
+              <a:t>1/27/2020</a:t>
             </a:fld>
             <a:endParaRPr lang="en-US" dirty="0"/>
           </a:p>
@@ -2088,7 +2093,7 @@
           <a:p>
             <a:fld id="{52E6D8D9-55A2-4063-B0F3-121F44549695}" type="datetimeFigureOut">
               <a:rPr lang="en-US" dirty="0"/>
-              <a:t>1/22/2020</a:t>
+              <a:t>1/27/2020</a:t>
             </a:fld>
             <a:endParaRPr lang="en-US" dirty="0"/>
           </a:p>
@@ -2764,7 +2769,7 @@
           <a:p>
             <a:fld id="{D4B24536-994D-4021-A283-9F449C0DB509}" type="datetimeFigureOut">
               <a:rPr lang="en-US" dirty="0"/>
-              <a:t>1/22/2020</a:t>
+              <a:t>1/27/2020</a:t>
             </a:fld>
             <a:endParaRPr lang="en-US" dirty="0"/>
           </a:p>
@@ -3672,7 +3677,7 @@
           <a:p>
             <a:fld id="{3CBBBB78-C96F-47B7-AB17-D852CA960AC9}" type="datetimeFigureOut">
               <a:rPr lang="en-US" dirty="0"/>
-              <a:t>1/22/2020</a:t>
+              <a:t>1/27/2020</a:t>
             </a:fld>
             <a:endParaRPr lang="en-US" dirty="0"/>
           </a:p>
@@ -3980,7 +3985,7 @@
           <a:p>
             <a:fld id="{1FA3F48C-C7C6-4055-9F49-3777875E72AE}" type="datetimeFigureOut">
               <a:rPr lang="en-US" dirty="0"/>
-              <a:t>1/22/2020</a:t>
+              <a:t>1/27/2020</a:t>
             </a:fld>
             <a:endParaRPr lang="en-US" dirty="0"/>
           </a:p>
@@ -4239,7 +4244,7 @@
           <a:p>
             <a:fld id="{6178E61D-D431-422C-9764-11DAFE33AB63}" type="datetimeFigureOut">
               <a:rPr lang="en-US" dirty="0"/>
-              <a:t>1/22/2020</a:t>
+              <a:t>1/27/2020</a:t>
             </a:fld>
             <a:endParaRPr lang="en-US" dirty="0"/>
           </a:p>
@@ -4558,7 +4563,7 @@
           <a:p>
             <a:fld id="{12DE42F4-6EEF-4EF7-8ED4-2208F0F89A08}" type="datetimeFigureOut">
               <a:rPr lang="en-US" dirty="0"/>
-              <a:t>1/22/2020</a:t>
+              <a:t>1/27/2020</a:t>
             </a:fld>
             <a:endParaRPr lang="en-US" dirty="0"/>
           </a:p>
@@ -4942,7 +4947,7 @@
           <a:p>
             <a:fld id="{30578ACC-22D6-47C1-A373-4FD133E34F3C}" type="datetimeFigureOut">
               <a:rPr lang="en-US" dirty="0"/>
-              <a:t>1/22/2020</a:t>
+              <a:t>1/27/2020</a:t>
             </a:fld>
             <a:endParaRPr lang="en-US" dirty="0"/>
           </a:p>
@@ -5313,7 +5318,7 @@
           <a:p>
             <a:fld id="{4E5A6C69-6797-4E8A-BF37-F2C3751466E9}" type="datetimeFigureOut">
               <a:rPr lang="en-US" dirty="0"/>
-              <a:t>1/22/2020</a:t>
+              <a:t>1/27/2020</a:t>
             </a:fld>
             <a:endParaRPr lang="en-US" dirty="0"/>
           </a:p>
@@ -5814,7 +5819,7 @@
           <a:p>
             <a:fld id="{D82014A1-A632-4878-A0D3-F52BA7563730}" type="datetimeFigureOut">
               <a:rPr lang="en-US" dirty="0"/>
-              <a:t>1/22/2020</a:t>
+              <a:t>1/27/2020</a:t>
             </a:fld>
             <a:endParaRPr lang="en-US" dirty="0"/>
           </a:p>
@@ -6066,7 +6071,7 @@
           <a:p>
             <a:fld id="{CE99F462-093F-4566-844B-4C71F2739DA5}" type="datetimeFigureOut">
               <a:rPr lang="en-US" dirty="0"/>
-              <a:t>1/22/2020</a:t>
+              <a:t>1/27/2020</a:t>
             </a:fld>
             <a:endParaRPr lang="en-US" dirty="0"/>
           </a:p>
@@ -6224,7 +6229,7 @@
           <a:p>
             <a:fld id="{3D24A7AC-904D-4781-85BA-7D10C17ED021}" type="datetimeFigureOut">
               <a:rPr lang="en-US" dirty="0"/>
-              <a:t>1/22/2020</a:t>
+              <a:t>1/27/2020</a:t>
             </a:fld>
             <a:endParaRPr lang="en-US" dirty="0"/>
           </a:p>
@@ -6609,7 +6614,7 @@
           <a:p>
             <a:fld id="{E331444B-B92B-4E27-8C94-BB93EAF5CB18}" type="datetimeFigureOut">
               <a:rPr lang="en-US" dirty="0"/>
-              <a:t>1/22/2020</a:t>
+              <a:t>1/27/2020</a:t>
             </a:fld>
             <a:endParaRPr lang="en-US" dirty="0"/>
           </a:p>
@@ -7013,7 +7018,7 @@
           <a:p>
             <a:fld id="{363EFA5E-FA76-400D-B3DC-F0BA90E6D107}" type="datetimeFigureOut">
               <a:rPr lang="en-US" dirty="0"/>
-              <a:t>1/22/2020</a:t>
+              <a:t>1/27/2020</a:t>
             </a:fld>
             <a:endParaRPr lang="en-US" dirty="0"/>
           </a:p>
@@ -7252,7 +7257,7 @@
           <a:p>
             <a:fld id="{9D6E9DEC-419B-4CC5-A080-3B06BD5A8291}" type="datetimeFigureOut">
               <a:rPr lang="en-US" dirty="0"/>
-              <a:t>1/22/2020</a:t>
+              <a:t>1/27/2020</a:t>
             </a:fld>
             <a:endParaRPr lang="en-US" dirty="0"/>
           </a:p>
@@ -7683,7 +7688,7 @@
           <a:p>
             <a:r>
               <a:rPr lang="en-US" dirty="0"/>
-              <a:t>Dextermiller.com</a:t>
+              <a:t>dextermiller.com</a:t>
             </a:r>
           </a:p>
         </p:txBody>
@@ -8385,8 +8390,29 @@
           <a:p>
             <a:r>
               <a:rPr lang="en-US" dirty="0"/>
-              <a:t>Need to add websites</a:t>
-            </a:r>
+              <a:t>Geeksforgeeks.org</a:t>
+            </a:r>
+          </a:p>
+          <a:p>
+            <a:r>
+              <a:rPr lang="en-US" dirty="0">
+                <a:hlinkClick r:id="rId2"/>
+              </a:rPr>
+              <a:t>medium.com</a:t>
+            </a:r>
+            <a:endParaRPr lang="en-US" dirty="0"/>
+          </a:p>
+          <a:p>
+            <a:r>
+              <a:rPr lang="en-US" dirty="0">
+                <a:hlinkClick r:id="rId3"/>
+              </a:rPr>
+              <a:t>towardsdatascience.com</a:t>
+            </a:r>
+            <a:endParaRPr lang="en-US" dirty="0"/>
+          </a:p>
+          <a:p>
+            <a:endParaRPr lang="en-US" dirty="0"/>
           </a:p>
         </p:txBody>
       </p:sp>

</xml_diff>